<commit_message>
Minor change on RdoNetOverview.pptx/RdoNetOverview.png.
</commit_message>
<xml_diff>
--- a/docs_src/primitives/RdoNetOverview.pptx
+++ b/docs_src/primitives/RdoNetOverview.pptx
@@ -243,7 +243,7 @@
           <a:p>
             <a:fld id="{E2DC313C-E62C-4C22-A1E0-847D782FC8C3}" type="datetimeFigureOut">
               <a:rPr lang="en-US" smtClean="0"/>
-              <a:t>4/17/2019</a:t>
+              <a:t>4/22/2019</a:t>
             </a:fld>
             <a:endParaRPr lang="en-US"/>
           </a:p>
@@ -413,7 +413,7 @@
           <a:p>
             <a:fld id="{E2DC313C-E62C-4C22-A1E0-847D782FC8C3}" type="datetimeFigureOut">
               <a:rPr lang="en-US" smtClean="0"/>
-              <a:t>4/17/2019</a:t>
+              <a:t>4/22/2019</a:t>
             </a:fld>
             <a:endParaRPr lang="en-US"/>
           </a:p>
@@ -593,7 +593,7 @@
           <a:p>
             <a:fld id="{E2DC313C-E62C-4C22-A1E0-847D782FC8C3}" type="datetimeFigureOut">
               <a:rPr lang="en-US" smtClean="0"/>
-              <a:t>4/17/2019</a:t>
+              <a:t>4/22/2019</a:t>
             </a:fld>
             <a:endParaRPr lang="en-US"/>
           </a:p>
@@ -763,7 +763,7 @@
           <a:p>
             <a:fld id="{E2DC313C-E62C-4C22-A1E0-847D782FC8C3}" type="datetimeFigureOut">
               <a:rPr lang="en-US" smtClean="0"/>
-              <a:t>4/17/2019</a:t>
+              <a:t>4/22/2019</a:t>
             </a:fld>
             <a:endParaRPr lang="en-US"/>
           </a:p>
@@ -1009,7 +1009,7 @@
           <a:p>
             <a:fld id="{E2DC313C-E62C-4C22-A1E0-847D782FC8C3}" type="datetimeFigureOut">
               <a:rPr lang="en-US" smtClean="0"/>
-              <a:t>4/17/2019</a:t>
+              <a:t>4/22/2019</a:t>
             </a:fld>
             <a:endParaRPr lang="en-US"/>
           </a:p>
@@ -1241,7 +1241,7 @@
           <a:p>
             <a:fld id="{E2DC313C-E62C-4C22-A1E0-847D782FC8C3}" type="datetimeFigureOut">
               <a:rPr lang="en-US" smtClean="0"/>
-              <a:t>4/17/2019</a:t>
+              <a:t>4/22/2019</a:t>
             </a:fld>
             <a:endParaRPr lang="en-US"/>
           </a:p>
@@ -1608,7 +1608,7 @@
           <a:p>
             <a:fld id="{E2DC313C-E62C-4C22-A1E0-847D782FC8C3}" type="datetimeFigureOut">
               <a:rPr lang="en-US" smtClean="0"/>
-              <a:t>4/17/2019</a:t>
+              <a:t>4/22/2019</a:t>
             </a:fld>
             <a:endParaRPr lang="en-US"/>
           </a:p>
@@ -1726,7 +1726,7 @@
           <a:p>
             <a:fld id="{E2DC313C-E62C-4C22-A1E0-847D782FC8C3}" type="datetimeFigureOut">
               <a:rPr lang="en-US" smtClean="0"/>
-              <a:t>4/17/2019</a:t>
+              <a:t>4/22/2019</a:t>
             </a:fld>
             <a:endParaRPr lang="en-US"/>
           </a:p>
@@ -1821,7 +1821,7 @@
           <a:p>
             <a:fld id="{E2DC313C-E62C-4C22-A1E0-847D782FC8C3}" type="datetimeFigureOut">
               <a:rPr lang="en-US" smtClean="0"/>
-              <a:t>4/17/2019</a:t>
+              <a:t>4/22/2019</a:t>
             </a:fld>
             <a:endParaRPr lang="en-US"/>
           </a:p>
@@ -2098,7 +2098,7 @@
           <a:p>
             <a:fld id="{E2DC313C-E62C-4C22-A1E0-847D782FC8C3}" type="datetimeFigureOut">
               <a:rPr lang="en-US" smtClean="0"/>
-              <a:t>4/17/2019</a:t>
+              <a:t>4/22/2019</a:t>
             </a:fld>
             <a:endParaRPr lang="en-US"/>
           </a:p>
@@ -2351,7 +2351,7 @@
           <a:p>
             <a:fld id="{E2DC313C-E62C-4C22-A1E0-847D782FC8C3}" type="datetimeFigureOut">
               <a:rPr lang="en-US" smtClean="0"/>
-              <a:t>4/17/2019</a:t>
+              <a:t>4/22/2019</a:t>
             </a:fld>
             <a:endParaRPr lang="en-US"/>
           </a:p>
@@ -2564,7 +2564,7 @@
           <a:p>
             <a:fld id="{E2DC313C-E62C-4C22-A1E0-847D782FC8C3}" type="datetimeFigureOut">
               <a:rPr lang="en-US" smtClean="0"/>
-              <a:t>4/17/2019</a:t>
+              <a:t>4/22/2019</a:t>
             </a:fld>
             <a:endParaRPr lang="en-US"/>
           </a:p>
@@ -4292,9 +4292,9 @@
           <p:nvPr/>
         </p:nvCxnSpPr>
         <p:spPr>
-          <a:xfrm>
-            <a:off x="1314450" y="5414914"/>
-            <a:ext cx="8958262" cy="0"/>
+          <a:xfrm flipV="1">
+            <a:off x="1314450" y="5412192"/>
+            <a:ext cx="8596032" cy="2722"/>
           </a:xfrm>
           <a:prstGeom prst="line">
             <a:avLst/>
@@ -4402,7 +4402,7 @@
         </p:blipFill>
         <p:spPr>
           <a:xfrm>
-            <a:off x="7378174" y="6585422"/>
+            <a:off x="6954311" y="6595720"/>
             <a:ext cx="198751" cy="194468"/>
           </a:xfrm>
           <a:prstGeom prst="rect">
@@ -4418,7 +4418,7 @@
         </p:nvSpPr>
         <p:spPr>
           <a:xfrm>
-            <a:off x="7604220" y="6554010"/>
+            <a:off x="7180357" y="6564308"/>
             <a:ext cx="976549" cy="246221"/>
           </a:xfrm>
           <a:prstGeom prst="rect">
@@ -4467,7 +4467,7 @@
         </p:blipFill>
         <p:spPr bwMode="auto">
           <a:xfrm>
-            <a:off x="8675848" y="6604592"/>
+            <a:off x="8251985" y="6614890"/>
             <a:ext cx="201963" cy="201963"/>
           </a:xfrm>
           <a:prstGeom prst="rect">
@@ -4493,7 +4493,7 @@
         </p:nvSpPr>
         <p:spPr>
           <a:xfrm>
-            <a:off x="8882588" y="6581725"/>
+            <a:off x="8458725" y="6592023"/>
             <a:ext cx="1390124" cy="246221"/>
           </a:xfrm>
           <a:prstGeom prst="rect">
@@ -4608,14 +4608,14 @@
       </p:sp>
       <p:sp>
         <p:nvSpPr>
-          <p:cNvPr id="63" name="TextBox 62"/>
+          <p:cNvPr id="64" name="TextBox 63"/>
           <p:cNvSpPr txBox="1"/>
           <p:nvPr/>
         </p:nvSpPr>
         <p:spPr>
           <a:xfrm>
-            <a:off x="2737477" y="5448109"/>
-            <a:ext cx="250390" cy="246221"/>
+            <a:off x="1243477" y="4665043"/>
+            <a:ext cx="2046596" cy="400110"/>
           </a:xfrm>
           <a:prstGeom prst="rect">
             <a:avLst/>
@@ -4623,28 +4623,37 @@
           <a:noFill/>
         </p:spPr>
         <p:txBody>
-          <a:bodyPr wrap="none" rtlCol="0">
+          <a:bodyPr wrap="square" rtlCol="0">
             <a:spAutoFit/>
           </a:bodyPr>
           <a:lstStyle/>
           <a:p>
             <a:r>
-              <a:rPr lang="en-US" sz="1000" dirty="0"/>
-              <a:t>2</a:t>
-            </a:r>
-          </a:p>
-        </p:txBody>
-      </p:sp>
-      <p:sp>
-        <p:nvSpPr>
-          <p:cNvPr id="64" name="TextBox 63"/>
+              <a:rPr lang="en-US" sz="1000" dirty="0" smtClean="0"/>
+              <a:t>Free, source code available at </a:t>
+            </a:r>
+            <a:r>
+              <a:rPr lang="en-US" sz="1000" dirty="0" err="1" smtClean="0"/>
+              <a:t>github</a:t>
+            </a:r>
+            <a:r>
+              <a:rPr lang="en-US" sz="1000" dirty="0" smtClean="0"/>
+              <a:t>.</a:t>
+            </a:r>
+            <a:endParaRPr lang="en-US" sz="1000" dirty="0"/>
+          </a:p>
+        </p:txBody>
+      </p:sp>
+      <p:sp>
+        <p:nvSpPr>
+          <p:cNvPr id="65" name="TextBox 64"/>
           <p:cNvSpPr txBox="1"/>
           <p:nvPr/>
         </p:nvSpPr>
         <p:spPr>
           <a:xfrm>
-            <a:off x="1243477" y="4665043"/>
-            <a:ext cx="2046596" cy="400110"/>
+            <a:off x="1243477" y="5788818"/>
+            <a:ext cx="2046596" cy="553998"/>
           </a:xfrm>
           <a:prstGeom prst="rect">
             <a:avLst/>
@@ -4659,53 +4668,7 @@
           <a:p>
             <a:r>
               <a:rPr lang="en-US" sz="1000" dirty="0" smtClean="0"/>
-              <a:t>Free</a:t>
-            </a:r>
-            <a:r>
-              <a:rPr lang="en-US" sz="1000" dirty="0" smtClean="0"/>
-              <a:t>, source code available at </a:t>
-            </a:r>
-            <a:r>
-              <a:rPr lang="en-US" sz="1000" dirty="0" err="1" smtClean="0"/>
-              <a:t>github</a:t>
-            </a:r>
-            <a:r>
-              <a:rPr lang="en-US" sz="1000" dirty="0" smtClean="0"/>
-              <a:t>.</a:t>
-            </a:r>
-            <a:endParaRPr lang="en-US" sz="1000" dirty="0"/>
-          </a:p>
-        </p:txBody>
-      </p:sp>
-      <p:sp>
-        <p:nvSpPr>
-          <p:cNvPr id="65" name="TextBox 64"/>
-          <p:cNvSpPr txBox="1"/>
-          <p:nvPr/>
-        </p:nvSpPr>
-        <p:spPr>
-          <a:xfrm>
-            <a:off x="1243477" y="5788818"/>
-            <a:ext cx="2046596" cy="553998"/>
-          </a:xfrm>
-          <a:prstGeom prst="rect">
-            <a:avLst/>
-          </a:prstGeom>
-          <a:noFill/>
-        </p:spPr>
-        <p:txBody>
-          <a:bodyPr wrap="square" rtlCol="0">
-            <a:spAutoFit/>
-          </a:bodyPr>
-          <a:lstStyle/>
-          <a:p>
-            <a:r>
-              <a:rPr lang="en-US" sz="1000" dirty="0" smtClean="0"/>
-              <a:t>Free </a:t>
-            </a:r>
-            <a:r>
-              <a:rPr lang="en-US" sz="1000" dirty="0" smtClean="0"/>
-              <a:t>for Visual Studio Community Edition, subscription required for other editions.</a:t>
+              <a:t>Free for Visual Studio Community Edition, subscription required for other editions.</a:t>
             </a:r>
             <a:endParaRPr lang="en-US" sz="1000" dirty="0"/>
           </a:p>
@@ -4719,7 +4682,7 @@
         </p:nvSpPr>
         <p:spPr>
           <a:xfrm>
-            <a:off x="6648847" y="6550947"/>
+            <a:off x="6224984" y="6561245"/>
             <a:ext cx="650412" cy="246221"/>
           </a:xfrm>
           <a:prstGeom prst="rect">

</xml_diff>

<commit_message>
Add https://my.devzest.com website url to RdoNetOverview.pptx/png.
</commit_message>
<xml_diff>
--- a/docs_src/primitives/RdoNetOverview.pptx
+++ b/docs_src/primitives/RdoNetOverview.pptx
@@ -243,7 +243,7 @@
           <a:p>
             <a:fld id="{E2DC313C-E62C-4C22-A1E0-847D782FC8C3}" type="datetimeFigureOut">
               <a:rPr lang="en-US" smtClean="0"/>
-              <a:t>4/22/2019</a:t>
+              <a:t>5/22/2019</a:t>
             </a:fld>
             <a:endParaRPr lang="en-US"/>
           </a:p>
@@ -413,7 +413,7 @@
           <a:p>
             <a:fld id="{E2DC313C-E62C-4C22-A1E0-847D782FC8C3}" type="datetimeFigureOut">
               <a:rPr lang="en-US" smtClean="0"/>
-              <a:t>4/22/2019</a:t>
+              <a:t>5/22/2019</a:t>
             </a:fld>
             <a:endParaRPr lang="en-US"/>
           </a:p>
@@ -593,7 +593,7 @@
           <a:p>
             <a:fld id="{E2DC313C-E62C-4C22-A1E0-847D782FC8C3}" type="datetimeFigureOut">
               <a:rPr lang="en-US" smtClean="0"/>
-              <a:t>4/22/2019</a:t>
+              <a:t>5/22/2019</a:t>
             </a:fld>
             <a:endParaRPr lang="en-US"/>
           </a:p>
@@ -763,7 +763,7 @@
           <a:p>
             <a:fld id="{E2DC313C-E62C-4C22-A1E0-847D782FC8C3}" type="datetimeFigureOut">
               <a:rPr lang="en-US" smtClean="0"/>
-              <a:t>4/22/2019</a:t>
+              <a:t>5/22/2019</a:t>
             </a:fld>
             <a:endParaRPr lang="en-US"/>
           </a:p>
@@ -1009,7 +1009,7 @@
           <a:p>
             <a:fld id="{E2DC313C-E62C-4C22-A1E0-847D782FC8C3}" type="datetimeFigureOut">
               <a:rPr lang="en-US" smtClean="0"/>
-              <a:t>4/22/2019</a:t>
+              <a:t>5/22/2019</a:t>
             </a:fld>
             <a:endParaRPr lang="en-US"/>
           </a:p>
@@ -1241,7 +1241,7 @@
           <a:p>
             <a:fld id="{E2DC313C-E62C-4C22-A1E0-847D782FC8C3}" type="datetimeFigureOut">
               <a:rPr lang="en-US" smtClean="0"/>
-              <a:t>4/22/2019</a:t>
+              <a:t>5/22/2019</a:t>
             </a:fld>
             <a:endParaRPr lang="en-US"/>
           </a:p>
@@ -1608,7 +1608,7 @@
           <a:p>
             <a:fld id="{E2DC313C-E62C-4C22-A1E0-847D782FC8C3}" type="datetimeFigureOut">
               <a:rPr lang="en-US" smtClean="0"/>
-              <a:t>4/22/2019</a:t>
+              <a:t>5/22/2019</a:t>
             </a:fld>
             <a:endParaRPr lang="en-US"/>
           </a:p>
@@ -1726,7 +1726,7 @@
           <a:p>
             <a:fld id="{E2DC313C-E62C-4C22-A1E0-847D782FC8C3}" type="datetimeFigureOut">
               <a:rPr lang="en-US" smtClean="0"/>
-              <a:t>4/22/2019</a:t>
+              <a:t>5/22/2019</a:t>
             </a:fld>
             <a:endParaRPr lang="en-US"/>
           </a:p>
@@ -1821,7 +1821,7 @@
           <a:p>
             <a:fld id="{E2DC313C-E62C-4C22-A1E0-847D782FC8C3}" type="datetimeFigureOut">
               <a:rPr lang="en-US" smtClean="0"/>
-              <a:t>4/22/2019</a:t>
+              <a:t>5/22/2019</a:t>
             </a:fld>
             <a:endParaRPr lang="en-US"/>
           </a:p>
@@ -2098,7 +2098,7 @@
           <a:p>
             <a:fld id="{E2DC313C-E62C-4C22-A1E0-847D782FC8C3}" type="datetimeFigureOut">
               <a:rPr lang="en-US" smtClean="0"/>
-              <a:t>4/22/2019</a:t>
+              <a:t>5/22/2019</a:t>
             </a:fld>
             <a:endParaRPr lang="en-US"/>
           </a:p>
@@ -2351,7 +2351,7 @@
           <a:p>
             <a:fld id="{E2DC313C-E62C-4C22-A1E0-847D782FC8C3}" type="datetimeFigureOut">
               <a:rPr lang="en-US" smtClean="0"/>
-              <a:t>4/22/2019</a:t>
+              <a:t>5/22/2019</a:t>
             </a:fld>
             <a:endParaRPr lang="en-US"/>
           </a:p>
@@ -2564,7 +2564,7 @@
           <a:p>
             <a:fld id="{E2DC313C-E62C-4C22-A1E0-847D782FC8C3}" type="datetimeFigureOut">
               <a:rPr lang="en-US" smtClean="0"/>
-              <a:t>4/22/2019</a:t>
+              <a:t>5/22/2019</a:t>
             </a:fld>
             <a:endParaRPr lang="en-US"/>
           </a:p>
@@ -2953,8 +2953,16 @@
 </file>
 
 <file path=ppt/slides/slide1.xml><?xml version="1.0" encoding="utf-8"?>
-<p:sld xmlns:a="http://schemas.openxmlformats.org/drawingml/2006/main" xmlns:r="http://schemas.openxmlformats.org/officeDocument/2006/relationships" xmlns:p="http://schemas.openxmlformats.org/presentationml/2006/main">
+<p:sld xmlns:a="http://schemas.openxmlformats.org/drawingml/2006/main" xmlns:r="http://schemas.openxmlformats.org/officeDocument/2006/relationships" xmlns:p="http://schemas.openxmlformats.org/presentationml/2006/main" showMasterSp="0">
   <p:cSld>
+    <p:bg>
+      <p:bgPr>
+        <a:solidFill>
+          <a:schemeClr val="bg1"/>
+        </a:solidFill>
+        <a:effectLst/>
+      </p:bgPr>
+    </p:bg>
     <p:spTree>
       <p:nvGrpSpPr>
         <p:cNvPr id="1" name=""/>
@@ -2977,7 +2985,7 @@
         </p:nvSpPr>
         <p:spPr>
           <a:xfrm>
-            <a:off x="3440205" y="3805032"/>
+            <a:off x="3418004" y="3579614"/>
             <a:ext cx="6408644" cy="1386295"/>
           </a:xfrm>
           <a:prstGeom prst="rect">
@@ -3038,7 +3046,7 @@
         </p:nvGrpSpPr>
         <p:grpSpPr>
           <a:xfrm>
-            <a:off x="3891680" y="4313966"/>
+            <a:off x="3869479" y="4088548"/>
             <a:ext cx="1770611" cy="369332"/>
             <a:chOff x="3714751" y="3422929"/>
             <a:chExt cx="1732452" cy="369332"/>
@@ -3122,7 +3130,7 @@
         </p:nvGrpSpPr>
         <p:grpSpPr>
           <a:xfrm>
-            <a:off x="6702197" y="4344645"/>
+            <a:off x="6679996" y="4119227"/>
             <a:ext cx="2730530" cy="369332"/>
             <a:chOff x="3714751" y="3422929"/>
             <a:chExt cx="2671684" cy="369332"/>
@@ -3206,7 +3214,7 @@
         </p:nvGrpSpPr>
         <p:grpSpPr>
           <a:xfrm>
-            <a:off x="3891680" y="4704629"/>
+            <a:off x="3869479" y="4479211"/>
             <a:ext cx="2424296" cy="369332"/>
             <a:chOff x="3714751" y="3422929"/>
             <a:chExt cx="2372050" cy="369332"/>
@@ -3290,7 +3298,7 @@
         </p:nvGrpSpPr>
         <p:grpSpPr>
           <a:xfrm>
-            <a:off x="6702197" y="4713977"/>
+            <a:off x="6679996" y="4488559"/>
             <a:ext cx="667307" cy="369332"/>
             <a:chOff x="3714751" y="3422929"/>
             <a:chExt cx="652926" cy="369332"/>
@@ -3529,8 +3537,8 @@
         </p:nvSpPr>
         <p:spPr>
           <a:xfrm>
-            <a:off x="3440205" y="5557653"/>
-            <a:ext cx="6408644" cy="976730"/>
+            <a:off x="3418004" y="5332234"/>
+            <a:ext cx="6408644" cy="1207619"/>
           </a:xfrm>
           <a:prstGeom prst="rect">
             <a:avLst/>
@@ -3821,7 +3829,7 @@
         </p:nvGrpSpPr>
         <p:grpSpPr>
           <a:xfrm>
-            <a:off x="6702197" y="5979295"/>
+            <a:off x="3865267" y="5739474"/>
             <a:ext cx="2693056" cy="369332"/>
             <a:chOff x="991319" y="1606552"/>
             <a:chExt cx="2693056" cy="369332"/>
@@ -3905,7 +3913,7 @@
         </p:nvGrpSpPr>
         <p:grpSpPr>
           <a:xfrm>
-            <a:off x="3884610" y="5988300"/>
+            <a:off x="3944758" y="6095719"/>
             <a:ext cx="2569349" cy="369332"/>
             <a:chOff x="645492" y="3759737"/>
             <a:chExt cx="2569349" cy="369332"/>
@@ -4000,7 +4008,7 @@
         </p:nvSpPr>
         <p:spPr>
           <a:xfrm>
-            <a:off x="1925960" y="3805032"/>
+            <a:off x="1903759" y="3579614"/>
             <a:ext cx="1422582" cy="369332"/>
           </a:xfrm>
           <a:prstGeom prst="rect">
@@ -4121,7 +4129,7 @@
         <p:spPr>
           <a:xfrm>
             <a:off x="3425454" y="3026553"/>
-            <a:ext cx="6401194" cy="630704"/>
+            <a:ext cx="6401194" cy="403431"/>
           </a:xfrm>
           <a:prstGeom prst="rect">
             <a:avLst/>
@@ -4293,7 +4301,7 @@
         </p:nvCxnSpPr>
         <p:spPr>
           <a:xfrm flipV="1">
-            <a:off x="1314450" y="5412192"/>
+            <a:off x="1292249" y="5186774"/>
             <a:ext cx="8596032" cy="2722"/>
           </a:xfrm>
           <a:prstGeom prst="line">
@@ -4328,7 +4336,7 @@
         </p:nvSpPr>
         <p:spPr>
           <a:xfrm>
-            <a:off x="1528652" y="5448109"/>
+            <a:off x="1506451" y="5222691"/>
             <a:ext cx="1334020" cy="369332"/>
           </a:xfrm>
           <a:prstGeom prst="rect">
@@ -4358,7 +4366,7 @@
         </p:nvSpPr>
         <p:spPr>
           <a:xfrm>
-            <a:off x="1532611" y="5042860"/>
+            <a:off x="1510410" y="4817442"/>
             <a:ext cx="1071127" cy="369332"/>
           </a:xfrm>
           <a:prstGeom prst="rect">
@@ -4402,7 +4410,7 @@
         </p:blipFill>
         <p:spPr>
           <a:xfrm>
-            <a:off x="6954311" y="6595720"/>
+            <a:off x="6020684" y="6574352"/>
             <a:ext cx="198751" cy="194468"/>
           </a:xfrm>
           <a:prstGeom prst="rect">
@@ -4418,7 +4426,7 @@
         </p:nvSpPr>
         <p:spPr>
           <a:xfrm>
-            <a:off x="7180357" y="6564308"/>
+            <a:off x="6190374" y="6569582"/>
             <a:ext cx="976549" cy="246221"/>
           </a:xfrm>
           <a:prstGeom prst="rect">
@@ -4467,7 +4475,7 @@
         </p:blipFill>
         <p:spPr bwMode="auto">
           <a:xfrm>
-            <a:off x="8251985" y="6614890"/>
+            <a:off x="7337185" y="6591300"/>
             <a:ext cx="201963" cy="201963"/>
           </a:xfrm>
           <a:prstGeom prst="rect">
@@ -4493,7 +4501,7 @@
         </p:nvSpPr>
         <p:spPr>
           <a:xfrm>
-            <a:off x="8458725" y="6592023"/>
+            <a:off x="7525389" y="6564317"/>
             <a:ext cx="1390124" cy="246221"/>
           </a:xfrm>
           <a:prstGeom prst="rect">
@@ -4502,7 +4510,7 @@
           <a:noFill/>
         </p:spPr>
         <p:txBody>
-          <a:bodyPr wrap="none" rtlCol="0">
+          <a:bodyPr wrap="square" rtlCol="0">
             <a:spAutoFit/>
           </a:bodyPr>
           <a:lstStyle/>
@@ -4523,7 +4531,7 @@
         </p:nvSpPr>
         <p:spPr>
           <a:xfrm>
-            <a:off x="1267668" y="5073192"/>
+            <a:off x="1245467" y="4847774"/>
             <a:ext cx="264794" cy="223587"/>
           </a:xfrm>
           <a:prstGeom prst="upArrow">
@@ -4571,7 +4579,7 @@
         </p:nvSpPr>
         <p:spPr>
           <a:xfrm>
-            <a:off x="1271477" y="5494906"/>
+            <a:off x="1249276" y="5269488"/>
             <a:ext cx="257175" cy="254250"/>
           </a:xfrm>
           <a:prstGeom prst="downArrow">
@@ -4614,7 +4622,7 @@
         </p:nvSpPr>
         <p:spPr>
           <a:xfrm>
-            <a:off x="1243477" y="4665043"/>
+            <a:off x="1221276" y="4439625"/>
             <a:ext cx="2046596" cy="400110"/>
           </a:xfrm>
           <a:prstGeom prst="rect">
@@ -4652,7 +4660,7 @@
         </p:nvSpPr>
         <p:spPr>
           <a:xfrm>
-            <a:off x="1243477" y="5788818"/>
+            <a:off x="1221276" y="5563400"/>
             <a:ext cx="2046596" cy="553998"/>
           </a:xfrm>
           <a:prstGeom prst="rect">
@@ -4682,7 +4690,7 @@
         </p:nvSpPr>
         <p:spPr>
           <a:xfrm>
-            <a:off x="6224984" y="6561245"/>
+            <a:off x="5297973" y="6569582"/>
             <a:ext cx="650412" cy="246221"/>
           </a:xfrm>
           <a:prstGeom prst="rect">
@@ -4699,6 +4707,149 @@
             <a:r>
               <a:rPr lang="en-US" sz="1000" dirty="0" smtClean="0"/>
               <a:t>Legend:</a:t>
+            </a:r>
+            <a:endParaRPr lang="en-US" sz="1000" dirty="0"/>
+          </a:p>
+        </p:txBody>
+      </p:sp>
+      <p:grpSp>
+        <p:nvGrpSpPr>
+          <p:cNvPr id="25" name="Group 24"/>
+          <p:cNvGrpSpPr/>
+          <p:nvPr/>
+        </p:nvGrpSpPr>
+        <p:grpSpPr>
+          <a:xfrm>
+            <a:off x="6736048" y="6095719"/>
+            <a:ext cx="2623706" cy="369332"/>
+            <a:chOff x="3869479" y="6076742"/>
+            <a:chExt cx="2623706" cy="369332"/>
+          </a:xfrm>
+        </p:grpSpPr>
+        <p:pic>
+          <p:nvPicPr>
+            <p:cNvPr id="24" name="Picture 23"/>
+            <p:cNvPicPr>
+              <a:picLocks noChangeAspect="1"/>
+            </p:cNvPicPr>
+            <p:nvPr/>
+          </p:nvPicPr>
+          <p:blipFill>
+            <a:blip r:embed="rId6">
+              <a:extLst>
+                <a:ext uri="{28A0092B-C50C-407E-A947-70E740481C1C}">
+                  <a14:useLocalDpi xmlns:a14="http://schemas.microsoft.com/office/drawing/2010/main" val="0"/>
+                </a:ext>
+              </a:extLst>
+            </a:blip>
+            <a:stretch>
+              <a:fillRect/>
+            </a:stretch>
+          </p:blipFill>
+          <p:spPr>
+            <a:xfrm>
+              <a:off x="3869479" y="6163895"/>
+              <a:ext cx="208920" cy="208920"/>
+            </a:xfrm>
+            <a:prstGeom prst="rect">
+              <a:avLst/>
+            </a:prstGeom>
+          </p:spPr>
+        </p:pic>
+        <p:sp>
+          <p:nvSpPr>
+            <p:cNvPr id="62" name="TextBox 61"/>
+            <p:cNvSpPr txBox="1"/>
+            <p:nvPr/>
+          </p:nvSpPr>
+          <p:spPr>
+            <a:xfrm>
+              <a:off x="4096119" y="6076742"/>
+              <a:ext cx="2397066" cy="369332"/>
+            </a:xfrm>
+            <a:prstGeom prst="rect">
+              <a:avLst/>
+            </a:prstGeom>
+            <a:noFill/>
+          </p:spPr>
+          <p:txBody>
+            <a:bodyPr wrap="none" rtlCol="0">
+              <a:spAutoFit/>
+            </a:bodyPr>
+            <a:lstStyle/>
+            <a:p>
+              <a:r>
+                <a:rPr lang="en-US" dirty="0" smtClean="0">
+                  <a:solidFill>
+                    <a:schemeClr val="bg1"/>
+                  </a:solidFill>
+                </a:rPr>
+                <a:t>https://my.devzest.com</a:t>
+              </a:r>
+              <a:endParaRPr lang="en-US" dirty="0">
+                <a:solidFill>
+                  <a:schemeClr val="bg1"/>
+                </a:solidFill>
+              </a:endParaRPr>
+            </a:p>
+          </p:txBody>
+        </p:sp>
+      </p:grpSp>
+      <p:pic>
+        <p:nvPicPr>
+          <p:cNvPr id="63" name="Picture 62"/>
+          <p:cNvPicPr>
+            <a:picLocks noChangeAspect="1"/>
+          </p:cNvPicPr>
+          <p:nvPr/>
+        </p:nvPicPr>
+        <p:blipFill>
+          <a:blip r:embed="rId6">
+            <a:extLst>
+              <a:ext uri="{28A0092B-C50C-407E-A947-70E740481C1C}">
+                <a14:useLocalDpi xmlns:a14="http://schemas.microsoft.com/office/drawing/2010/main" val="0"/>
+              </a:ext>
+            </a:extLst>
+          </a:blip>
+          <a:stretch>
+            <a:fillRect/>
+          </a:stretch>
+        </p:blipFill>
+        <p:spPr>
+          <a:xfrm>
+            <a:off x="8999257" y="6587022"/>
+            <a:ext cx="208920" cy="208920"/>
+          </a:xfrm>
+          <a:prstGeom prst="rect">
+            <a:avLst/>
+          </a:prstGeom>
+        </p:spPr>
+      </p:pic>
+      <p:sp>
+        <p:nvSpPr>
+          <p:cNvPr id="67" name="TextBox 66"/>
+          <p:cNvSpPr txBox="1"/>
+          <p:nvPr/>
+        </p:nvSpPr>
+        <p:spPr>
+          <a:xfrm>
+            <a:off x="9208177" y="6564317"/>
+            <a:ext cx="618471" cy="246221"/>
+          </a:xfrm>
+          <a:prstGeom prst="rect">
+            <a:avLst/>
+          </a:prstGeom>
+          <a:noFill/>
+        </p:spPr>
+        <p:txBody>
+          <a:bodyPr wrap="square" rtlCol="0">
+            <a:spAutoFit/>
+          </a:bodyPr>
+          <a:lstStyle/>
+          <a:p>
+            <a:r>
+              <a:rPr lang="en-US" sz="1000" dirty="0" smtClean="0"/>
+              <a:t>Website</a:t>
             </a:r>
             <a:endParaRPr lang="en-US" sz="1000" dirty="0"/>
           </a:p>

</xml_diff>